<commit_message>
Change config.properties class links to just the class id. Followed suit in main program. Some PPT doc adds
</commit_message>
<xml_diff>
--- a/docs/HomeworkCrawler.pptx
+++ b/docs/HomeworkCrawler.pptx
@@ -541,7 +541,7 @@
           <a:p>
             <a:fld id="{98F3FB35-C343-48D0-B8D3-5ED2C69C53EF}" type="datetimeFigureOut">
               <a:rPr lang="en-US" smtClean="0"/>
-              <a:t>11/5/2019</a:t>
+              <a:t>1/2/2020</a:t>
             </a:fld>
             <a:endParaRPr lang="en-US"/>
           </a:p>
@@ -753,7 +753,7 @@
           <a:p>
             <a:fld id="{98F3FB35-C343-48D0-B8D3-5ED2C69C53EF}" type="datetimeFigureOut">
               <a:rPr lang="en-US" smtClean="0"/>
-              <a:t>11/5/2019</a:t>
+              <a:t>1/2/2020</a:t>
             </a:fld>
             <a:endParaRPr lang="en-US"/>
           </a:p>
@@ -940,7 +940,7 @@
           <a:p>
             <a:fld id="{98F3FB35-C343-48D0-B8D3-5ED2C69C53EF}" type="datetimeFigureOut">
               <a:rPr lang="en-US" smtClean="0"/>
-              <a:t>11/5/2019</a:t>
+              <a:t>1/2/2020</a:t>
             </a:fld>
             <a:endParaRPr lang="en-US"/>
           </a:p>
@@ -1037,7 +1037,7 @@
           <a:p>
             <a:fld id="{98F3FB35-C343-48D0-B8D3-5ED2C69C53EF}" type="datetimeFigureOut">
               <a:rPr lang="en-US" smtClean="0"/>
-              <a:t>11/5/2019</a:t>
+              <a:t>1/2/2020</a:t>
             </a:fld>
             <a:endParaRPr lang="en-US"/>
           </a:p>
@@ -1633,7 +1633,7 @@
           <a:p>
             <a:fld id="{98F3FB35-C343-48D0-B8D3-5ED2C69C53EF}" type="datetimeFigureOut">
               <a:rPr lang="en-US" smtClean="0"/>
-              <a:t>11/5/2019</a:t>
+              <a:t>1/2/2020</a:t>
             </a:fld>
             <a:endParaRPr lang="en-US"/>
           </a:p>
@@ -1730,7 +1730,7 @@
           <a:p>
             <a:fld id="{98F3FB35-C343-48D0-B8D3-5ED2C69C53EF}" type="datetimeFigureOut">
               <a:rPr lang="en-US" smtClean="0"/>
-              <a:t>11/5/2019</a:t>
+              <a:t>1/2/2020</a:t>
             </a:fld>
             <a:endParaRPr lang="en-US"/>
           </a:p>
@@ -2335,7 +2335,7 @@
           <a:p>
             <a:fld id="{98F3FB35-C343-48D0-B8D3-5ED2C69C53EF}" type="datetimeFigureOut">
               <a:rPr lang="en-US" smtClean="0"/>
-              <a:t>11/5/2019</a:t>
+              <a:t>1/2/2020</a:t>
             </a:fld>
             <a:endParaRPr lang="en-US"/>
           </a:p>
@@ -2478,7 +2478,7 @@
           <a:p>
             <a:fld id="{98F3FB35-C343-48D0-B8D3-5ED2C69C53EF}" type="datetimeFigureOut">
               <a:rPr lang="en-US" smtClean="0"/>
-              <a:t>11/5/2019</a:t>
+              <a:t>1/2/2020</a:t>
             </a:fld>
             <a:endParaRPr lang="en-US"/>
           </a:p>
@@ -2575,7 +2575,7 @@
           <a:p>
             <a:fld id="{98F3FB35-C343-48D0-B8D3-5ED2C69C53EF}" type="datetimeFigureOut">
               <a:rPr lang="en-US" smtClean="0"/>
-              <a:t>11/5/2019</a:t>
+              <a:t>1/2/2020</a:t>
             </a:fld>
             <a:endParaRPr lang="en-US"/>
           </a:p>
@@ -2859,7 +2859,7 @@
           <a:p>
             <a:fld id="{98F3FB35-C343-48D0-B8D3-5ED2C69C53EF}" type="datetimeFigureOut">
               <a:rPr lang="en-US" smtClean="0"/>
-              <a:t>11/5/2019</a:t>
+              <a:t>1/2/2020</a:t>
             </a:fld>
             <a:endParaRPr lang="en-US"/>
           </a:p>
@@ -3381,7 +3381,7 @@
           <a:p>
             <a:fld id="{98F3FB35-C343-48D0-B8D3-5ED2C69C53EF}" type="datetimeFigureOut">
               <a:rPr lang="en-US" smtClean="0"/>
-              <a:t>11/5/2019</a:t>
+              <a:t>1/2/2020</a:t>
             </a:fld>
             <a:endParaRPr lang="en-US"/>
           </a:p>
@@ -3901,7 +3901,7 @@
           <a:p>
             <a:fld id="{98F3FB35-C343-48D0-B8D3-5ED2C69C53EF}" type="datetimeFigureOut">
               <a:rPr lang="en-US" smtClean="0"/>
-              <a:t>11/5/2019</a:t>
+              <a:t>1/2/2020</a:t>
             </a:fld>
             <a:endParaRPr lang="en-US"/>
           </a:p>
@@ -4562,6 +4562,57 @@
           </a:extLst>
         </p:spPr>
       </p:pic>
+      <p:sp>
+        <p:nvSpPr>
+          <p:cNvPr id="2" name="TextBox 1"/>
+          <p:cNvSpPr txBox="1"/>
+          <p:nvPr/>
+        </p:nvSpPr>
+        <p:spPr>
+          <a:xfrm>
+            <a:off x="0" y="57834"/>
+            <a:ext cx="9017212" cy="646331"/>
+          </a:xfrm>
+          <a:prstGeom prst="rect">
+            <a:avLst/>
+          </a:prstGeom>
+          <a:noFill/>
+        </p:spPr>
+        <p:txBody>
+          <a:bodyPr wrap="none" rtlCol="0">
+            <a:spAutoFit/>
+          </a:bodyPr>
+          <a:lstStyle/>
+          <a:p>
+            <a:r>
+              <a:rPr lang="en-US" dirty="0" smtClean="0"/>
+              <a:t>NOTE: This doc moved to Tom’s </a:t>
+            </a:r>
+            <a:r>
+              <a:rPr lang="en-US" dirty="0" err="1" smtClean="0"/>
+              <a:t>Gdocs</a:t>
+            </a:r>
+            <a:r>
+              <a:rPr lang="en-US" dirty="0"/>
+              <a:t> </a:t>
+            </a:r>
+            <a:r>
+              <a:rPr lang="en-US" dirty="0" smtClean="0"/>
+              <a:t>@</a:t>
+            </a:r>
+          </a:p>
+          <a:p>
+            <a:r>
+              <a:rPr lang="en-US" dirty="0" smtClean="0"/>
+              <a:t>https</a:t>
+            </a:r>
+            <a:r>
+              <a:rPr lang="en-US" dirty="0"/>
+              <a:t>://drive.google.com/drive/u/0/folders/1HL6VSMSldBhIBpAMPGwQkbs7r1q60ktv</a:t>
+            </a:r>
+          </a:p>
+        </p:txBody>
+      </p:sp>
     </p:spTree>
     <p:extLst>
       <p:ext uri="{BB962C8B-B14F-4D97-AF65-F5344CB8AC3E}">

</xml_diff>